<commit_message>
Improved text and diagrams for 'what is openEHR' page
</commit_message>
<xml_diff>
--- a/files/diagrams/openEHR-diagrams.pptx
+++ b/files/diagrams/openEHR-diagrams.pptx
@@ -309,7 +309,7 @@
             <a:fld id="{B5D90370-989B-4ABA-8A4B-40E0440E5CA2}" type="datetimeFigureOut">
               <a:rPr lang="en-GB" smtClean="0"/>
               <a:pPr/>
-              <a:t>31/12/2012</a:t>
+              <a:t>02/01/2013</a:t>
             </a:fld>
             <a:endParaRPr lang="en-GB"/>
           </a:p>
@@ -476,7 +476,7 @@
             <a:fld id="{B5D90370-989B-4ABA-8A4B-40E0440E5CA2}" type="datetimeFigureOut">
               <a:rPr lang="en-GB" smtClean="0"/>
               <a:pPr/>
-              <a:t>31/12/2012</a:t>
+              <a:t>02/01/2013</a:t>
             </a:fld>
             <a:endParaRPr lang="en-GB"/>
           </a:p>
@@ -653,7 +653,7 @@
             <a:fld id="{B5D90370-989B-4ABA-8A4B-40E0440E5CA2}" type="datetimeFigureOut">
               <a:rPr lang="en-GB" smtClean="0"/>
               <a:pPr/>
-              <a:t>31/12/2012</a:t>
+              <a:t>02/01/2013</a:t>
             </a:fld>
             <a:endParaRPr lang="en-GB"/>
           </a:p>
@@ -864,7 +864,7 @@
               <a:pPr>
                 <a:defRPr/>
               </a:pPr>
-              <a:t>12/31/2012</a:t>
+              <a:t>1/2/2013</a:t>
             </a:fld>
             <a:endParaRPr lang="en-AU" dirty="0"/>
           </a:p>
@@ -1059,7 +1059,7 @@
             <a:fld id="{B5D90370-989B-4ABA-8A4B-40E0440E5CA2}" type="datetimeFigureOut">
               <a:rPr lang="en-GB" smtClean="0"/>
               <a:pPr/>
-              <a:t>31/12/2012</a:t>
+              <a:t>02/01/2013</a:t>
             </a:fld>
             <a:endParaRPr lang="en-GB"/>
           </a:p>
@@ -1302,7 +1302,7 @@
             <a:fld id="{B5D90370-989B-4ABA-8A4B-40E0440E5CA2}" type="datetimeFigureOut">
               <a:rPr lang="en-GB" smtClean="0"/>
               <a:pPr/>
-              <a:t>31/12/2012</a:t>
+              <a:t>02/01/2013</a:t>
             </a:fld>
             <a:endParaRPr lang="en-GB"/>
           </a:p>
@@ -1587,7 +1587,7 @@
             <a:fld id="{B5D90370-989B-4ABA-8A4B-40E0440E5CA2}" type="datetimeFigureOut">
               <a:rPr lang="en-GB" smtClean="0"/>
               <a:pPr/>
-              <a:t>31/12/2012</a:t>
+              <a:t>02/01/2013</a:t>
             </a:fld>
             <a:endParaRPr lang="en-GB"/>
           </a:p>
@@ -2006,7 +2006,7 @@
             <a:fld id="{B5D90370-989B-4ABA-8A4B-40E0440E5CA2}" type="datetimeFigureOut">
               <a:rPr lang="en-GB" smtClean="0"/>
               <a:pPr/>
-              <a:t>31/12/2012</a:t>
+              <a:t>02/01/2013</a:t>
             </a:fld>
             <a:endParaRPr lang="en-GB"/>
           </a:p>
@@ -2121,7 +2121,7 @@
             <a:fld id="{B5D90370-989B-4ABA-8A4B-40E0440E5CA2}" type="datetimeFigureOut">
               <a:rPr lang="en-GB" smtClean="0"/>
               <a:pPr/>
-              <a:t>31/12/2012</a:t>
+              <a:t>02/01/2013</a:t>
             </a:fld>
             <a:endParaRPr lang="en-GB"/>
           </a:p>
@@ -2213,7 +2213,7 @@
             <a:fld id="{B5D90370-989B-4ABA-8A4B-40E0440E5CA2}" type="datetimeFigureOut">
               <a:rPr lang="en-GB" smtClean="0"/>
               <a:pPr/>
-              <a:t>31/12/2012</a:t>
+              <a:t>02/01/2013</a:t>
             </a:fld>
             <a:endParaRPr lang="en-GB"/>
           </a:p>
@@ -2487,7 +2487,7 @@
             <a:fld id="{B5D90370-989B-4ABA-8A4B-40E0440E5CA2}" type="datetimeFigureOut">
               <a:rPr lang="en-GB" smtClean="0"/>
               <a:pPr/>
-              <a:t>31/12/2012</a:t>
+              <a:t>02/01/2013</a:t>
             </a:fld>
             <a:endParaRPr lang="en-GB"/>
           </a:p>
@@ -2737,7 +2737,7 @@
             <a:fld id="{B5D90370-989B-4ABA-8A4B-40E0440E5CA2}" type="datetimeFigureOut">
               <a:rPr lang="en-GB" smtClean="0"/>
               <a:pPr/>
-              <a:t>31/12/2012</a:t>
+              <a:t>02/01/2013</a:t>
             </a:fld>
             <a:endParaRPr lang="en-GB"/>
           </a:p>
@@ -2947,7 +2947,7 @@
             <a:fld id="{B5D90370-989B-4ABA-8A4B-40E0440E5CA2}" type="datetimeFigureOut">
               <a:rPr lang="en-GB" smtClean="0"/>
               <a:pPr/>
-              <a:t>31/12/2012</a:t>
+              <a:t>02/01/2013</a:t>
             </a:fld>
             <a:endParaRPr lang="en-GB"/>
           </a:p>
@@ -27839,7 +27839,7 @@
         </p:nvGrpSpPr>
         <p:grpSpPr>
           <a:xfrm>
-            <a:off x="1006361" y="2492896"/>
+            <a:off x="1547664" y="2708920"/>
             <a:ext cx="2773551" cy="2448272"/>
             <a:chOff x="467544" y="2780928"/>
             <a:chExt cx="2773551" cy="2448272"/>
@@ -28722,6 +28722,872 @@
           </p:txBody>
         </p:sp>
       </p:grpSp>
+      <p:grpSp>
+        <p:nvGrpSpPr>
+          <p:cNvPr id="33" name="Group 32"/>
+          <p:cNvGrpSpPr/>
+          <p:nvPr/>
+        </p:nvGrpSpPr>
+        <p:grpSpPr>
+          <a:xfrm>
+            <a:off x="5508104" y="2564904"/>
+            <a:ext cx="2546673" cy="2115599"/>
+            <a:chOff x="5148064" y="1430751"/>
+            <a:chExt cx="1927682" cy="1601385"/>
+          </a:xfrm>
+        </p:grpSpPr>
+        <p:sp>
+          <p:nvSpPr>
+            <p:cNvPr id="61" name="Rectangle 60"/>
+            <p:cNvSpPr/>
+            <p:nvPr/>
+          </p:nvSpPr>
+          <p:spPr>
+            <a:xfrm>
+              <a:off x="6012160" y="2060848"/>
+              <a:ext cx="899047" cy="372747"/>
+            </a:xfrm>
+            <a:prstGeom prst="rect">
+              <a:avLst/>
+            </a:prstGeom>
+            <a:solidFill>
+              <a:srgbClr val="F0D288"/>
+            </a:solidFill>
+            <a:ln w="3175">
+              <a:solidFill>
+                <a:srgbClr val="F0D288"/>
+              </a:solidFill>
+            </a:ln>
+            <a:effectLst>
+              <a:outerShdw blurRad="50800" dist="38100" dir="2700000" algn="tl" rotWithShape="0">
+                <a:prstClr val="black">
+                  <a:alpha val="40000"/>
+                </a:prstClr>
+              </a:outerShdw>
+            </a:effectLst>
+          </p:spPr>
+          <p:style>
+            <a:lnRef idx="2">
+              <a:schemeClr val="accent1">
+                <a:shade val="50000"/>
+              </a:schemeClr>
+            </a:lnRef>
+            <a:fillRef idx="1">
+              <a:schemeClr val="accent1"/>
+            </a:fillRef>
+            <a:effectRef idx="0">
+              <a:schemeClr val="accent1"/>
+            </a:effectRef>
+            <a:fontRef idx="minor">
+              <a:schemeClr val="lt1"/>
+            </a:fontRef>
+          </p:style>
+          <p:txBody>
+            <a:bodyPr rtlCol="0" anchor="ctr"/>
+            <a:lstStyle/>
+            <a:p>
+              <a:pPr algn="ctr"/>
+              <a:r>
+                <a:rPr lang="en-GB" sz="1600" i="1" dirty="0" smtClean="0">
+                  <a:solidFill>
+                    <a:schemeClr val="accent6">
+                      <a:lumMod val="75000"/>
+                    </a:schemeClr>
+                  </a:solidFill>
+                </a:rPr>
+                <a:t>open</a:t>
+              </a:r>
+              <a:r>
+                <a:rPr lang="en-GB" sz="1600" dirty="0" smtClean="0">
+                  <a:solidFill>
+                    <a:srgbClr val="002060"/>
+                  </a:solidFill>
+                </a:rPr>
+                <a:t>EHR platform</a:t>
+              </a:r>
+              <a:endParaRPr lang="en-GB" sz="1600" dirty="0">
+                <a:solidFill>
+                  <a:srgbClr val="002060"/>
+                </a:solidFill>
+              </a:endParaRPr>
+            </a:p>
+          </p:txBody>
+        </p:sp>
+        <p:sp>
+          <p:nvSpPr>
+            <p:cNvPr id="62" name="TextBox 61"/>
+            <p:cNvSpPr txBox="1"/>
+            <p:nvPr/>
+          </p:nvSpPr>
+          <p:spPr>
+            <a:xfrm>
+              <a:off x="5805250" y="2438502"/>
+              <a:ext cx="496758" cy="209672"/>
+            </a:xfrm>
+            <a:prstGeom prst="rect">
+              <a:avLst/>
+            </a:prstGeom>
+            <a:noFill/>
+          </p:spPr>
+          <p:txBody>
+            <a:bodyPr wrap="none" rtlCol="0">
+              <a:spAutoFit/>
+            </a:bodyPr>
+            <a:lstStyle/>
+            <a:p>
+              <a:r>
+                <a:rPr lang="en-GB" sz="1200" i="1" dirty="0" smtClean="0">
+                  <a:solidFill>
+                    <a:schemeClr val="accent6">
+                      <a:lumMod val="75000"/>
+                    </a:schemeClr>
+                  </a:solidFill>
+                </a:rPr>
+                <a:t>commit</a:t>
+              </a:r>
+              <a:endParaRPr lang="en-GB" sz="1200" i="1" dirty="0">
+                <a:solidFill>
+                  <a:schemeClr val="accent6">
+                    <a:lumMod val="75000"/>
+                  </a:schemeClr>
+                </a:solidFill>
+              </a:endParaRPr>
+            </a:p>
+          </p:txBody>
+        </p:sp>
+        <p:sp>
+          <p:nvSpPr>
+            <p:cNvPr id="63" name="Rectangle 62"/>
+            <p:cNvSpPr/>
+            <p:nvPr/>
+          </p:nvSpPr>
+          <p:spPr>
+            <a:xfrm>
+              <a:off x="6012160" y="1781288"/>
+              <a:ext cx="433114" cy="232967"/>
+            </a:xfrm>
+            <a:prstGeom prst="rect">
+              <a:avLst/>
+            </a:prstGeom>
+            <a:solidFill>
+              <a:srgbClr val="F0D288"/>
+            </a:solidFill>
+            <a:ln w="3175">
+              <a:solidFill>
+                <a:schemeClr val="accent5">
+                  <a:lumMod val="20000"/>
+                  <a:lumOff val="80000"/>
+                </a:schemeClr>
+              </a:solidFill>
+            </a:ln>
+            <a:effectLst/>
+          </p:spPr>
+          <p:style>
+            <a:lnRef idx="2">
+              <a:schemeClr val="accent1">
+                <a:shade val="50000"/>
+              </a:schemeClr>
+            </a:lnRef>
+            <a:fillRef idx="1">
+              <a:schemeClr val="accent1"/>
+            </a:fillRef>
+            <a:effectRef idx="0">
+              <a:schemeClr val="accent1"/>
+            </a:effectRef>
+            <a:fontRef idx="minor">
+              <a:schemeClr val="lt1"/>
+            </a:fontRef>
+          </p:style>
+          <p:txBody>
+            <a:bodyPr lIns="36000" tIns="0" rIns="36000" bIns="0" rtlCol="0" anchor="ctr"/>
+            <a:lstStyle/>
+            <a:p>
+              <a:pPr algn="ctr"/>
+              <a:r>
+                <a:rPr lang="en-GB" sz="1200" i="1" dirty="0" smtClean="0">
+                  <a:solidFill>
+                    <a:schemeClr val="accent6">
+                      <a:lumMod val="75000"/>
+                    </a:schemeClr>
+                  </a:solidFill>
+                </a:rPr>
+                <a:t>record</a:t>
+              </a:r>
+              <a:endParaRPr lang="en-GB" sz="1600" dirty="0">
+                <a:solidFill>
+                  <a:srgbClr val="002060"/>
+                </a:solidFill>
+              </a:endParaRPr>
+            </a:p>
+          </p:txBody>
+        </p:sp>
+        <p:sp>
+          <p:nvSpPr>
+            <p:cNvPr id="64" name="Down Arrow 63"/>
+            <p:cNvSpPr/>
+            <p:nvPr/>
+          </p:nvSpPr>
+          <p:spPr>
+            <a:xfrm>
+              <a:off x="6305493" y="2473015"/>
+              <a:ext cx="93186" cy="175211"/>
+            </a:xfrm>
+            <a:prstGeom prst="downArrow">
+              <a:avLst/>
+            </a:prstGeom>
+            <a:solidFill>
+              <a:srgbClr val="002060"/>
+            </a:solidFill>
+            <a:ln w="6350">
+              <a:solidFill>
+                <a:schemeClr val="bg1">
+                  <a:lumMod val="50000"/>
+                </a:schemeClr>
+              </a:solidFill>
+            </a:ln>
+          </p:spPr>
+          <p:style>
+            <a:lnRef idx="2">
+              <a:schemeClr val="accent1">
+                <a:shade val="50000"/>
+              </a:schemeClr>
+            </a:lnRef>
+            <a:fillRef idx="1">
+              <a:schemeClr val="accent1"/>
+            </a:fillRef>
+            <a:effectRef idx="0">
+              <a:schemeClr val="accent1"/>
+            </a:effectRef>
+            <a:fontRef idx="minor">
+              <a:schemeClr val="lt1"/>
+            </a:fontRef>
+          </p:style>
+          <p:txBody>
+            <a:bodyPr rtlCol="0" anchor="ctr"/>
+            <a:lstStyle/>
+            <a:p>
+              <a:pPr algn="ctr"/>
+              <a:endParaRPr lang="en-GB" sz="1600"/>
+            </a:p>
+          </p:txBody>
+        </p:sp>
+        <p:sp>
+          <p:nvSpPr>
+            <p:cNvPr id="65" name="Down Arrow 64"/>
+            <p:cNvSpPr/>
+            <p:nvPr/>
+          </p:nvSpPr>
+          <p:spPr>
+            <a:xfrm flipV="1">
+              <a:off x="6538460" y="2473015"/>
+              <a:ext cx="93186" cy="175211"/>
+            </a:xfrm>
+            <a:prstGeom prst="downArrow">
+              <a:avLst/>
+            </a:prstGeom>
+            <a:solidFill>
+              <a:srgbClr val="002060"/>
+            </a:solidFill>
+            <a:ln w="6350">
+              <a:solidFill>
+                <a:schemeClr val="bg1">
+                  <a:lumMod val="50000"/>
+                </a:schemeClr>
+              </a:solidFill>
+            </a:ln>
+          </p:spPr>
+          <p:style>
+            <a:lnRef idx="2">
+              <a:schemeClr val="accent1">
+                <a:shade val="50000"/>
+              </a:schemeClr>
+            </a:lnRef>
+            <a:fillRef idx="1">
+              <a:schemeClr val="accent1"/>
+            </a:fillRef>
+            <a:effectRef idx="0">
+              <a:schemeClr val="accent1"/>
+            </a:effectRef>
+            <a:fontRef idx="minor">
+              <a:schemeClr val="lt1"/>
+            </a:fontRef>
+          </p:style>
+          <p:txBody>
+            <a:bodyPr rtlCol="0" anchor="ctr"/>
+            <a:lstStyle/>
+            <a:p>
+              <a:pPr algn="ctr"/>
+              <a:endParaRPr lang="en-GB" sz="1600"/>
+            </a:p>
+          </p:txBody>
+        </p:sp>
+        <p:sp>
+          <p:nvSpPr>
+            <p:cNvPr id="66" name="TextBox 65"/>
+            <p:cNvSpPr txBox="1"/>
+            <p:nvPr/>
+          </p:nvSpPr>
+          <p:spPr>
+            <a:xfrm>
+              <a:off x="6566004" y="2426626"/>
+              <a:ext cx="407356" cy="209672"/>
+            </a:xfrm>
+            <a:prstGeom prst="rect">
+              <a:avLst/>
+            </a:prstGeom>
+            <a:noFill/>
+          </p:spPr>
+          <p:txBody>
+            <a:bodyPr wrap="none" rtlCol="0">
+              <a:spAutoFit/>
+            </a:bodyPr>
+            <a:lstStyle/>
+            <a:p>
+              <a:r>
+                <a:rPr lang="en-GB" sz="1200" i="1" dirty="0" smtClean="0">
+                  <a:solidFill>
+                    <a:schemeClr val="accent6">
+                      <a:lumMod val="75000"/>
+                    </a:schemeClr>
+                  </a:solidFill>
+                </a:rPr>
+                <a:t>query</a:t>
+              </a:r>
+              <a:endParaRPr lang="en-GB" sz="1200" i="1" dirty="0">
+                <a:solidFill>
+                  <a:schemeClr val="accent6">
+                    <a:lumMod val="75000"/>
+                  </a:schemeClr>
+                </a:solidFill>
+              </a:endParaRPr>
+            </a:p>
+          </p:txBody>
+        </p:sp>
+        <p:sp>
+          <p:nvSpPr>
+            <p:cNvPr id="67" name="Can 66"/>
+            <p:cNvSpPr/>
+            <p:nvPr/>
+          </p:nvSpPr>
+          <p:spPr>
+            <a:xfrm>
+              <a:off x="6012160" y="2659389"/>
+              <a:ext cx="899047" cy="372747"/>
+            </a:xfrm>
+            <a:prstGeom prst="can">
+              <a:avLst/>
+            </a:prstGeom>
+            <a:solidFill>
+              <a:srgbClr val="002060"/>
+            </a:solidFill>
+            <a:ln w="6350">
+              <a:solidFill>
+                <a:srgbClr val="002060"/>
+              </a:solidFill>
+            </a:ln>
+            <a:effectLst/>
+          </p:spPr>
+          <p:style>
+            <a:lnRef idx="2">
+              <a:schemeClr val="accent1">
+                <a:shade val="50000"/>
+              </a:schemeClr>
+            </a:lnRef>
+            <a:fillRef idx="1">
+              <a:schemeClr val="accent1"/>
+            </a:fillRef>
+            <a:effectRef idx="0">
+              <a:schemeClr val="accent1"/>
+            </a:effectRef>
+            <a:fontRef idx="minor">
+              <a:schemeClr val="lt1"/>
+            </a:fontRef>
+          </p:style>
+          <p:txBody>
+            <a:bodyPr rtlCol="0" anchor="ctr"/>
+            <a:lstStyle/>
+            <a:p>
+              <a:pPr algn="ctr"/>
+              <a:r>
+                <a:rPr lang="en-GB" sz="1200" dirty="0" smtClean="0">
+                  <a:solidFill>
+                    <a:schemeClr val="bg1"/>
+                  </a:solidFill>
+                </a:rPr>
+                <a:t>health information</a:t>
+              </a:r>
+              <a:endParaRPr lang="en-GB" sz="1200" dirty="0">
+                <a:solidFill>
+                  <a:schemeClr val="bg1"/>
+                </a:solidFill>
+              </a:endParaRPr>
+            </a:p>
+          </p:txBody>
+        </p:sp>
+        <p:sp>
+          <p:nvSpPr>
+            <p:cNvPr id="68" name="Rectangle 67"/>
+            <p:cNvSpPr/>
+            <p:nvPr/>
+          </p:nvSpPr>
+          <p:spPr>
+            <a:xfrm>
+              <a:off x="6475374" y="1781288"/>
+              <a:ext cx="435833" cy="232967"/>
+            </a:xfrm>
+            <a:prstGeom prst="rect">
+              <a:avLst/>
+            </a:prstGeom>
+            <a:solidFill>
+              <a:srgbClr val="F0D288"/>
+            </a:solidFill>
+            <a:ln w="3175">
+              <a:solidFill>
+                <a:schemeClr val="accent5">
+                  <a:lumMod val="20000"/>
+                  <a:lumOff val="80000"/>
+                </a:schemeClr>
+              </a:solidFill>
+            </a:ln>
+            <a:effectLst/>
+          </p:spPr>
+          <p:style>
+            <a:lnRef idx="2">
+              <a:schemeClr val="accent1">
+                <a:shade val="50000"/>
+              </a:schemeClr>
+            </a:lnRef>
+            <a:fillRef idx="1">
+              <a:schemeClr val="accent1"/>
+            </a:fillRef>
+            <a:effectRef idx="0">
+              <a:schemeClr val="accent1"/>
+            </a:effectRef>
+            <a:fontRef idx="minor">
+              <a:schemeClr val="lt1"/>
+            </a:fontRef>
+          </p:style>
+          <p:txBody>
+            <a:bodyPr lIns="36000" tIns="0" rIns="36000" bIns="0" rtlCol="0" anchor="ctr"/>
+            <a:lstStyle/>
+            <a:p>
+              <a:pPr algn="ctr"/>
+              <a:r>
+                <a:rPr lang="en-GB" sz="1200" i="1" dirty="0" smtClean="0">
+                  <a:solidFill>
+                    <a:schemeClr val="accent6">
+                      <a:lumMod val="75000"/>
+                    </a:schemeClr>
+                  </a:solidFill>
+                </a:rPr>
+                <a:t>analyze</a:t>
+              </a:r>
+              <a:endParaRPr lang="en-GB" sz="1600" dirty="0">
+                <a:solidFill>
+                  <a:srgbClr val="002060"/>
+                </a:solidFill>
+              </a:endParaRPr>
+            </a:p>
+          </p:txBody>
+        </p:sp>
+        <p:sp>
+          <p:nvSpPr>
+            <p:cNvPr id="69" name="Flowchart: Document 68"/>
+            <p:cNvSpPr/>
+            <p:nvPr/>
+          </p:nvSpPr>
+          <p:spPr>
+            <a:xfrm>
+              <a:off x="5164557" y="2060848"/>
+              <a:ext cx="605714" cy="360421"/>
+            </a:xfrm>
+            <a:prstGeom prst="flowChartDocument">
+              <a:avLst/>
+            </a:prstGeom>
+            <a:solidFill>
+              <a:srgbClr val="F7EFC1"/>
+            </a:solidFill>
+            <a:ln w="6350">
+              <a:solidFill>
+                <a:srgbClr val="F7EFC1"/>
+              </a:solidFill>
+            </a:ln>
+            <a:effectLst>
+              <a:outerShdw blurRad="50800" dist="38100" dir="2700000" algn="tl" rotWithShape="0">
+                <a:prstClr val="black">
+                  <a:alpha val="40000"/>
+                </a:prstClr>
+              </a:outerShdw>
+            </a:effectLst>
+          </p:spPr>
+          <p:style>
+            <a:lnRef idx="2">
+              <a:schemeClr val="accent1">
+                <a:shade val="50000"/>
+              </a:schemeClr>
+            </a:lnRef>
+            <a:fillRef idx="1">
+              <a:schemeClr val="accent1"/>
+            </a:fillRef>
+            <a:effectRef idx="0">
+              <a:schemeClr val="accent1"/>
+            </a:effectRef>
+            <a:fontRef idx="minor">
+              <a:schemeClr val="lt1"/>
+            </a:fontRef>
+          </p:style>
+          <p:txBody>
+            <a:bodyPr lIns="36000" tIns="0" rIns="36000" bIns="0" rtlCol="0" anchor="ctr"/>
+            <a:lstStyle/>
+            <a:p>
+              <a:pPr algn="ctr"/>
+              <a:r>
+                <a:rPr lang="en-GB" sz="1400" dirty="0" smtClean="0">
+                  <a:solidFill>
+                    <a:srgbClr val="002060"/>
+                  </a:solidFill>
+                  <a:latin typeface="Arial" pitchFamily="34" charset="0"/>
+                  <a:cs typeface="Arial" pitchFamily="34" charset="0"/>
+                </a:rPr>
+                <a:t>Clinical models</a:t>
+              </a:r>
+              <a:endParaRPr lang="en-GB" sz="1400" dirty="0">
+                <a:solidFill>
+                  <a:srgbClr val="002060"/>
+                </a:solidFill>
+                <a:latin typeface="Arial" pitchFamily="34" charset="0"/>
+                <a:cs typeface="Arial" pitchFamily="34" charset="0"/>
+              </a:endParaRPr>
+            </a:p>
+          </p:txBody>
+        </p:sp>
+        <p:sp>
+          <p:nvSpPr>
+            <p:cNvPr id="70" name="Down Arrow 69"/>
+            <p:cNvSpPr/>
+            <p:nvPr/>
+          </p:nvSpPr>
+          <p:spPr>
+            <a:xfrm rot="16200000">
+              <a:off x="5859177" y="2193884"/>
+              <a:ext cx="93186" cy="128616"/>
+            </a:xfrm>
+            <a:prstGeom prst="downArrow">
+              <a:avLst/>
+            </a:prstGeom>
+            <a:solidFill>
+              <a:srgbClr val="F7EFC1"/>
+            </a:solidFill>
+            <a:ln w="6350">
+              <a:solidFill>
+                <a:schemeClr val="bg1">
+                  <a:lumMod val="50000"/>
+                </a:schemeClr>
+              </a:solidFill>
+            </a:ln>
+          </p:spPr>
+          <p:style>
+            <a:lnRef idx="2">
+              <a:schemeClr val="accent1">
+                <a:shade val="50000"/>
+              </a:schemeClr>
+            </a:lnRef>
+            <a:fillRef idx="1">
+              <a:schemeClr val="accent1"/>
+            </a:fillRef>
+            <a:effectRef idx="0">
+              <a:schemeClr val="accent1"/>
+            </a:effectRef>
+            <a:fontRef idx="minor">
+              <a:schemeClr val="lt1"/>
+            </a:fontRef>
+          </p:style>
+          <p:txBody>
+            <a:bodyPr rtlCol="0" anchor="ctr"/>
+            <a:lstStyle/>
+            <a:p>
+              <a:pPr algn="ctr"/>
+              <a:endParaRPr lang="en-GB" sz="1600"/>
+            </a:p>
+          </p:txBody>
+        </p:sp>
+        <p:sp>
+          <p:nvSpPr>
+            <p:cNvPr id="71" name="Can 70"/>
+            <p:cNvSpPr/>
+            <p:nvPr/>
+          </p:nvSpPr>
+          <p:spPr>
+            <a:xfrm>
+              <a:off x="5148064" y="2480189"/>
+              <a:ext cx="648072" cy="279560"/>
+            </a:xfrm>
+            <a:prstGeom prst="can">
+              <a:avLst/>
+            </a:prstGeom>
+            <a:solidFill>
+              <a:schemeClr val="bg1"/>
+            </a:solidFill>
+            <a:ln w="3175">
+              <a:solidFill>
+                <a:schemeClr val="bg1">
+                  <a:lumMod val="65000"/>
+                </a:schemeClr>
+              </a:solidFill>
+            </a:ln>
+            <a:effectLst/>
+          </p:spPr>
+          <p:style>
+            <a:lnRef idx="2">
+              <a:schemeClr val="accent1">
+                <a:shade val="50000"/>
+              </a:schemeClr>
+            </a:lnRef>
+            <a:fillRef idx="1">
+              <a:schemeClr val="accent1"/>
+            </a:fillRef>
+            <a:effectRef idx="0">
+              <a:schemeClr val="accent1"/>
+            </a:effectRef>
+            <a:fontRef idx="minor">
+              <a:schemeClr val="lt1"/>
+            </a:fontRef>
+          </p:style>
+          <p:txBody>
+            <a:bodyPr lIns="36000" tIns="0" rIns="36000" bIns="0" rtlCol="0" anchor="ctr"/>
+            <a:lstStyle/>
+            <a:p>
+              <a:pPr algn="ctr"/>
+              <a:r>
+                <a:rPr lang="en-GB" sz="1400" dirty="0" smtClean="0">
+                  <a:solidFill>
+                    <a:schemeClr val="bg1">
+                      <a:lumMod val="50000"/>
+                    </a:schemeClr>
+                  </a:solidFill>
+                  <a:latin typeface="Arial Narrow" pitchFamily="34" charset="0"/>
+                </a:rPr>
+                <a:t>terminology</a:t>
+              </a:r>
+              <a:endParaRPr lang="en-GB" sz="1600" dirty="0">
+                <a:solidFill>
+                  <a:schemeClr val="bg1">
+                    <a:lumMod val="50000"/>
+                  </a:schemeClr>
+                </a:solidFill>
+                <a:latin typeface="Arial Narrow" pitchFamily="34" charset="0"/>
+              </a:endParaRPr>
+            </a:p>
+          </p:txBody>
+        </p:sp>
+        <p:sp>
+          <p:nvSpPr>
+            <p:cNvPr id="72" name="TextBox 71"/>
+            <p:cNvSpPr txBox="1"/>
+            <p:nvPr/>
+          </p:nvSpPr>
+          <p:spPr>
+            <a:xfrm>
+              <a:off x="6004106" y="1430751"/>
+              <a:ext cx="395173" cy="232969"/>
+            </a:xfrm>
+            <a:prstGeom prst="rect">
+              <a:avLst/>
+            </a:prstGeom>
+            <a:noFill/>
+          </p:spPr>
+          <p:txBody>
+            <a:bodyPr wrap="none" rtlCol="0">
+              <a:spAutoFit/>
+            </a:bodyPr>
+            <a:lstStyle/>
+            <a:p>
+              <a:r>
+                <a:rPr lang="en-GB" sz="1400" i="1" dirty="0" smtClean="0">
+                  <a:solidFill>
+                    <a:srgbClr val="002060"/>
+                  </a:solidFill>
+                </a:rPr>
+                <a:t>data</a:t>
+              </a:r>
+              <a:endParaRPr lang="en-GB" sz="1400" i="1" dirty="0">
+                <a:solidFill>
+                  <a:srgbClr val="002060"/>
+                </a:solidFill>
+              </a:endParaRPr>
+            </a:p>
+          </p:txBody>
+        </p:sp>
+        <p:sp>
+          <p:nvSpPr>
+            <p:cNvPr id="73" name="Down Arrow 72"/>
+            <p:cNvSpPr/>
+            <p:nvPr/>
+          </p:nvSpPr>
+          <p:spPr>
+            <a:xfrm>
+              <a:off x="6196539" y="1620964"/>
+              <a:ext cx="93186" cy="128618"/>
+            </a:xfrm>
+            <a:prstGeom prst="downArrow">
+              <a:avLst/>
+            </a:prstGeom>
+            <a:solidFill>
+              <a:schemeClr val="accent5">
+                <a:lumMod val="20000"/>
+                <a:lumOff val="80000"/>
+              </a:schemeClr>
+            </a:solidFill>
+            <a:ln w="6350">
+              <a:solidFill>
+                <a:schemeClr val="bg1">
+                  <a:lumMod val="50000"/>
+                </a:schemeClr>
+              </a:solidFill>
+            </a:ln>
+          </p:spPr>
+          <p:style>
+            <a:lnRef idx="2">
+              <a:schemeClr val="accent1">
+                <a:shade val="50000"/>
+              </a:schemeClr>
+            </a:lnRef>
+            <a:fillRef idx="1">
+              <a:schemeClr val="accent1"/>
+            </a:fillRef>
+            <a:effectRef idx="0">
+              <a:schemeClr val="accent1"/>
+            </a:effectRef>
+            <a:fontRef idx="minor">
+              <a:schemeClr val="lt1"/>
+            </a:fontRef>
+          </p:style>
+          <p:txBody>
+            <a:bodyPr rtlCol="0" anchor="ctr"/>
+            <a:lstStyle/>
+            <a:p>
+              <a:pPr algn="ctr"/>
+              <a:endParaRPr lang="en-GB" sz="1600"/>
+            </a:p>
+          </p:txBody>
+        </p:sp>
+        <p:sp>
+          <p:nvSpPr>
+            <p:cNvPr id="74" name="Down Arrow 73"/>
+            <p:cNvSpPr/>
+            <p:nvPr/>
+          </p:nvSpPr>
+          <p:spPr>
+            <a:xfrm flipV="1">
+              <a:off x="6635423" y="1620964"/>
+              <a:ext cx="93186" cy="128618"/>
+            </a:xfrm>
+            <a:prstGeom prst="downArrow">
+              <a:avLst/>
+            </a:prstGeom>
+            <a:solidFill>
+              <a:schemeClr val="accent5">
+                <a:lumMod val="20000"/>
+                <a:lumOff val="80000"/>
+              </a:schemeClr>
+            </a:solidFill>
+            <a:ln w="6350">
+              <a:solidFill>
+                <a:schemeClr val="bg1">
+                  <a:lumMod val="50000"/>
+                </a:schemeClr>
+              </a:solidFill>
+            </a:ln>
+          </p:spPr>
+          <p:style>
+            <a:lnRef idx="2">
+              <a:schemeClr val="accent1">
+                <a:shade val="50000"/>
+              </a:schemeClr>
+            </a:lnRef>
+            <a:fillRef idx="1">
+              <a:schemeClr val="accent1"/>
+            </a:fillRef>
+            <a:effectRef idx="0">
+              <a:schemeClr val="accent1"/>
+            </a:effectRef>
+            <a:fontRef idx="minor">
+              <a:schemeClr val="lt1"/>
+            </a:fontRef>
+          </p:style>
+          <p:txBody>
+            <a:bodyPr rtlCol="0" anchor="ctr"/>
+            <a:lstStyle/>
+            <a:p>
+              <a:pPr algn="ctr"/>
+              <a:endParaRPr lang="en-GB" sz="1600"/>
+            </a:p>
+          </p:txBody>
+        </p:sp>
+        <p:sp>
+          <p:nvSpPr>
+            <p:cNvPr id="75" name="TextBox 74"/>
+            <p:cNvSpPr txBox="1"/>
+            <p:nvPr/>
+          </p:nvSpPr>
+          <p:spPr>
+            <a:xfrm>
+              <a:off x="6303697" y="1430751"/>
+              <a:ext cx="772049" cy="232969"/>
+            </a:xfrm>
+            <a:prstGeom prst="rect">
+              <a:avLst/>
+            </a:prstGeom>
+            <a:noFill/>
+          </p:spPr>
+          <p:txBody>
+            <a:bodyPr wrap="none" rtlCol="0">
+              <a:spAutoFit/>
+            </a:bodyPr>
+            <a:lstStyle/>
+            <a:p>
+              <a:r>
+                <a:rPr lang="en-GB" sz="1400" i="1" dirty="0" smtClean="0">
+                  <a:solidFill>
+                    <a:srgbClr val="002060"/>
+                  </a:solidFill>
+                </a:rPr>
+                <a:t>conclusions</a:t>
+              </a:r>
+              <a:endParaRPr lang="en-GB" sz="1400" i="1" dirty="0">
+                <a:solidFill>
+                  <a:srgbClr val="002060"/>
+                </a:solidFill>
+              </a:endParaRPr>
+            </a:p>
+          </p:txBody>
+        </p:sp>
+      </p:grpSp>
+    </p:spTree>
+  </p:cSld>
+  <p:clrMapOvr>
+    <a:masterClrMapping/>
+  </p:clrMapOvr>
+</p:sld>
+</file>
+
+<file path=ppt/slides/slide6.xml><?xml version="1.0" encoding="utf-8"?>
+<p:sld xmlns:a="http://schemas.openxmlformats.org/drawingml/2006/main" xmlns:r="http://schemas.openxmlformats.org/officeDocument/2006/relationships" xmlns:p="http://schemas.openxmlformats.org/presentationml/2006/main">
+  <p:cSld>
+    <p:spTree>
+      <p:nvGrpSpPr>
+        <p:cNvPr id="1" name=""/>
+        <p:cNvGrpSpPr/>
+        <p:nvPr/>
+      </p:nvGrpSpPr>
+      <p:grpSpPr>
+        <a:xfrm>
+          <a:off x="0" y="0"/>
+          <a:ext cx="0" cy="0"/>
+          <a:chOff x="0" y="0"/>
+          <a:chExt cx="0" cy="0"/>
+        </a:xfrm>
+      </p:grpSpPr>
       <p:sp>
         <p:nvSpPr>
           <p:cNvPr id="61" name="Rectangle 60"/>
@@ -29568,877 +30434,6 @@
           </a:p>
         </p:txBody>
       </p:sp>
-    </p:spTree>
-  </p:cSld>
-  <p:clrMapOvr>
-    <a:masterClrMapping/>
-  </p:clrMapOvr>
-</p:sld>
-</file>
-
-<file path=ppt/slides/slide6.xml><?xml version="1.0" encoding="utf-8"?>
-<p:sld xmlns:a="http://schemas.openxmlformats.org/drawingml/2006/main" xmlns:r="http://schemas.openxmlformats.org/officeDocument/2006/relationships" xmlns:p="http://schemas.openxmlformats.org/presentationml/2006/main">
-  <p:cSld>
-    <p:spTree>
-      <p:nvGrpSpPr>
-        <p:cNvPr id="1" name=""/>
-        <p:cNvGrpSpPr/>
-        <p:nvPr/>
-      </p:nvGrpSpPr>
-      <p:grpSpPr>
-        <a:xfrm>
-          <a:off x="0" y="0"/>
-          <a:ext cx="0" cy="0"/>
-          <a:chOff x="0" y="0"/>
-          <a:chExt cx="0" cy="0"/>
-        </a:xfrm>
-      </p:grpSpPr>
-      <p:sp>
-        <p:nvSpPr>
-          <p:cNvPr id="61" name="Rectangle 60"/>
-          <p:cNvSpPr/>
-          <p:nvPr/>
-        </p:nvSpPr>
-        <p:spPr>
-          <a:xfrm>
-            <a:off x="6012160" y="2060848"/>
-            <a:ext cx="899047" cy="372747"/>
-          </a:xfrm>
-          <a:prstGeom prst="rect">
-            <a:avLst/>
-          </a:prstGeom>
-          <a:solidFill>
-            <a:schemeClr val="accent5">
-              <a:lumMod val="40000"/>
-              <a:lumOff val="60000"/>
-            </a:schemeClr>
-          </a:solidFill>
-          <a:ln w="3175">
-            <a:solidFill>
-              <a:schemeClr val="accent5">
-                <a:lumMod val="20000"/>
-                <a:lumOff val="80000"/>
-              </a:schemeClr>
-            </a:solidFill>
-          </a:ln>
-          <a:effectLst/>
-        </p:spPr>
-        <p:style>
-          <a:lnRef idx="2">
-            <a:schemeClr val="accent1">
-              <a:shade val="50000"/>
-            </a:schemeClr>
-          </a:lnRef>
-          <a:fillRef idx="1">
-            <a:schemeClr val="accent1"/>
-          </a:fillRef>
-          <a:effectRef idx="0">
-            <a:schemeClr val="accent1"/>
-          </a:effectRef>
-          <a:fontRef idx="minor">
-            <a:schemeClr val="lt1"/>
-          </a:fontRef>
-        </p:style>
-        <p:txBody>
-          <a:bodyPr rtlCol="0" anchor="ctr"/>
-          <a:lstStyle/>
-          <a:p>
-            <a:pPr algn="ctr"/>
-            <a:r>
-              <a:rPr lang="en-GB" sz="1050" i="1" dirty="0" smtClean="0">
-                <a:solidFill>
-                  <a:schemeClr val="accent6">
-                    <a:lumMod val="75000"/>
-                  </a:schemeClr>
-                </a:solidFill>
-              </a:rPr>
-              <a:t>open</a:t>
-            </a:r>
-            <a:r>
-              <a:rPr lang="en-GB" sz="1050" dirty="0" smtClean="0">
-                <a:solidFill>
-                  <a:srgbClr val="002060"/>
-                </a:solidFill>
-              </a:rPr>
-              <a:t>EHR platform</a:t>
-            </a:r>
-            <a:endParaRPr lang="en-GB" sz="1050" dirty="0">
-              <a:solidFill>
-                <a:srgbClr val="002060"/>
-              </a:solidFill>
-            </a:endParaRPr>
-          </a:p>
-        </p:txBody>
-      </p:sp>
-      <p:sp>
-        <p:nvSpPr>
-          <p:cNvPr id="62" name="TextBox 61"/>
-          <p:cNvSpPr txBox="1"/>
-          <p:nvPr/>
-        </p:nvSpPr>
-        <p:spPr>
-          <a:xfrm>
-            <a:off x="5829003" y="2432564"/>
-            <a:ext cx="596638" cy="253916"/>
-          </a:xfrm>
-          <a:prstGeom prst="rect">
-            <a:avLst/>
-          </a:prstGeom>
-          <a:noFill/>
-        </p:spPr>
-        <p:txBody>
-          <a:bodyPr wrap="none" rtlCol="0">
-            <a:spAutoFit/>
-          </a:bodyPr>
-          <a:lstStyle/>
-          <a:p>
-            <a:r>
-              <a:rPr lang="en-GB" sz="1000" i="1" dirty="0" smtClean="0">
-                <a:solidFill>
-                  <a:schemeClr val="accent6">
-                    <a:lumMod val="75000"/>
-                  </a:schemeClr>
-                </a:solidFill>
-              </a:rPr>
-              <a:t>commit</a:t>
-            </a:r>
-            <a:endParaRPr lang="en-GB" sz="1000" i="1" dirty="0">
-              <a:solidFill>
-                <a:schemeClr val="accent6">
-                  <a:lumMod val="75000"/>
-                </a:schemeClr>
-              </a:solidFill>
-            </a:endParaRPr>
-          </a:p>
-        </p:txBody>
-      </p:sp>
-      <p:sp>
-        <p:nvSpPr>
-          <p:cNvPr id="63" name="Rectangle 62"/>
-          <p:cNvSpPr/>
-          <p:nvPr/>
-        </p:nvSpPr>
-        <p:spPr>
-          <a:xfrm>
-            <a:off x="6012160" y="1781288"/>
-            <a:ext cx="433114" cy="232967"/>
-          </a:xfrm>
-          <a:prstGeom prst="rect">
-            <a:avLst/>
-          </a:prstGeom>
-          <a:solidFill>
-            <a:schemeClr val="accent5">
-              <a:lumMod val="20000"/>
-              <a:lumOff val="80000"/>
-            </a:schemeClr>
-          </a:solidFill>
-          <a:ln w="3175">
-            <a:solidFill>
-              <a:schemeClr val="accent5">
-                <a:lumMod val="20000"/>
-                <a:lumOff val="80000"/>
-              </a:schemeClr>
-            </a:solidFill>
-          </a:ln>
-          <a:effectLst/>
-        </p:spPr>
-        <p:style>
-          <a:lnRef idx="2">
-            <a:schemeClr val="accent1">
-              <a:shade val="50000"/>
-            </a:schemeClr>
-          </a:lnRef>
-          <a:fillRef idx="1">
-            <a:schemeClr val="accent1"/>
-          </a:fillRef>
-          <a:effectRef idx="0">
-            <a:schemeClr val="accent1"/>
-          </a:effectRef>
-          <a:fontRef idx="minor">
-            <a:schemeClr val="lt1"/>
-          </a:fontRef>
-        </p:style>
-        <p:txBody>
-          <a:bodyPr lIns="36000" tIns="0" rIns="36000" bIns="0" rtlCol="0" anchor="ctr"/>
-          <a:lstStyle/>
-          <a:p>
-            <a:pPr algn="ctr"/>
-            <a:r>
-              <a:rPr lang="en-GB" sz="900" i="1" dirty="0" smtClean="0">
-                <a:solidFill>
-                  <a:schemeClr val="accent6">
-                    <a:lumMod val="75000"/>
-                  </a:schemeClr>
-                </a:solidFill>
-              </a:rPr>
-              <a:t>record</a:t>
-            </a:r>
-            <a:endParaRPr lang="en-GB" sz="1050" dirty="0">
-              <a:solidFill>
-                <a:srgbClr val="002060"/>
-              </a:solidFill>
-            </a:endParaRPr>
-          </a:p>
-        </p:txBody>
-      </p:sp>
-      <p:sp>
-        <p:nvSpPr>
-          <p:cNvPr id="64" name="Down Arrow 63"/>
-          <p:cNvSpPr/>
-          <p:nvPr/>
-        </p:nvSpPr>
-        <p:spPr>
-          <a:xfrm>
-            <a:off x="6305493" y="2461139"/>
-            <a:ext cx="93186" cy="175211"/>
-          </a:xfrm>
-          <a:prstGeom prst="downArrow">
-            <a:avLst/>
-          </a:prstGeom>
-          <a:solidFill>
-            <a:schemeClr val="accent5">
-              <a:lumMod val="40000"/>
-              <a:lumOff val="60000"/>
-            </a:schemeClr>
-          </a:solidFill>
-          <a:ln w="6350">
-            <a:solidFill>
-              <a:schemeClr val="bg1">
-                <a:lumMod val="50000"/>
-              </a:schemeClr>
-            </a:solidFill>
-          </a:ln>
-        </p:spPr>
-        <p:style>
-          <a:lnRef idx="2">
-            <a:schemeClr val="accent1">
-              <a:shade val="50000"/>
-            </a:schemeClr>
-          </a:lnRef>
-          <a:fillRef idx="1">
-            <a:schemeClr val="accent1"/>
-          </a:fillRef>
-          <a:effectRef idx="0">
-            <a:schemeClr val="accent1"/>
-          </a:effectRef>
-          <a:fontRef idx="minor">
-            <a:schemeClr val="lt1"/>
-          </a:fontRef>
-        </p:style>
-        <p:txBody>
-          <a:bodyPr rtlCol="0" anchor="ctr"/>
-          <a:lstStyle/>
-          <a:p>
-            <a:pPr algn="ctr"/>
-            <a:endParaRPr lang="en-GB" sz="1050"/>
-          </a:p>
-        </p:txBody>
-      </p:sp>
-      <p:sp>
-        <p:nvSpPr>
-          <p:cNvPr id="65" name="Down Arrow 64"/>
-          <p:cNvSpPr/>
-          <p:nvPr/>
-        </p:nvSpPr>
-        <p:spPr>
-          <a:xfrm flipV="1">
-            <a:off x="6538460" y="2461139"/>
-            <a:ext cx="93186" cy="175211"/>
-          </a:xfrm>
-          <a:prstGeom prst="downArrow">
-            <a:avLst/>
-          </a:prstGeom>
-          <a:solidFill>
-            <a:schemeClr val="accent5">
-              <a:lumMod val="40000"/>
-              <a:lumOff val="60000"/>
-            </a:schemeClr>
-          </a:solidFill>
-          <a:ln w="6350">
-            <a:solidFill>
-              <a:schemeClr val="bg1">
-                <a:lumMod val="50000"/>
-              </a:schemeClr>
-            </a:solidFill>
-          </a:ln>
-        </p:spPr>
-        <p:style>
-          <a:lnRef idx="2">
-            <a:schemeClr val="accent1">
-              <a:shade val="50000"/>
-            </a:schemeClr>
-          </a:lnRef>
-          <a:fillRef idx="1">
-            <a:schemeClr val="accent1"/>
-          </a:fillRef>
-          <a:effectRef idx="0">
-            <a:schemeClr val="accent1"/>
-          </a:effectRef>
-          <a:fontRef idx="minor">
-            <a:schemeClr val="lt1"/>
-          </a:fontRef>
-        </p:style>
-        <p:txBody>
-          <a:bodyPr rtlCol="0" anchor="ctr"/>
-          <a:lstStyle/>
-          <a:p>
-            <a:pPr algn="ctr"/>
-            <a:endParaRPr lang="en-GB" sz="1050"/>
-          </a:p>
-        </p:txBody>
-      </p:sp>
-      <p:sp>
-        <p:nvSpPr>
-          <p:cNvPr id="66" name="TextBox 65"/>
-          <p:cNvSpPr txBox="1"/>
-          <p:nvPr/>
-        </p:nvSpPr>
-        <p:spPr>
-          <a:xfrm>
-            <a:off x="6566005" y="2432564"/>
-            <a:ext cx="494046" cy="253916"/>
-          </a:xfrm>
-          <a:prstGeom prst="rect">
-            <a:avLst/>
-          </a:prstGeom>
-          <a:noFill/>
-        </p:spPr>
-        <p:txBody>
-          <a:bodyPr wrap="none" rtlCol="0">
-            <a:spAutoFit/>
-          </a:bodyPr>
-          <a:lstStyle/>
-          <a:p>
-            <a:r>
-              <a:rPr lang="en-GB" sz="1000" i="1" dirty="0" smtClean="0">
-                <a:solidFill>
-                  <a:schemeClr val="accent6">
-                    <a:lumMod val="75000"/>
-                  </a:schemeClr>
-                </a:solidFill>
-              </a:rPr>
-              <a:t>query</a:t>
-            </a:r>
-            <a:endParaRPr lang="en-GB" sz="1000" i="1" dirty="0">
-              <a:solidFill>
-                <a:schemeClr val="accent6">
-                  <a:lumMod val="75000"/>
-                </a:schemeClr>
-              </a:solidFill>
-            </a:endParaRPr>
-          </a:p>
-        </p:txBody>
-      </p:sp>
-      <p:sp>
-        <p:nvSpPr>
-          <p:cNvPr id="67" name="Can 66"/>
-          <p:cNvSpPr/>
-          <p:nvPr/>
-        </p:nvSpPr>
-        <p:spPr>
-          <a:xfrm>
-            <a:off x="6012160" y="2647513"/>
-            <a:ext cx="899047" cy="372747"/>
-          </a:xfrm>
-          <a:prstGeom prst="can">
-            <a:avLst/>
-          </a:prstGeom>
-          <a:solidFill>
-            <a:schemeClr val="accent5">
-              <a:lumMod val="60000"/>
-              <a:lumOff val="40000"/>
-            </a:schemeClr>
-          </a:solidFill>
-          <a:ln w="6350">
-            <a:solidFill>
-              <a:schemeClr val="accent5">
-                <a:lumMod val="60000"/>
-                <a:lumOff val="40000"/>
-              </a:schemeClr>
-            </a:solidFill>
-          </a:ln>
-          <a:effectLst/>
-        </p:spPr>
-        <p:style>
-          <a:lnRef idx="2">
-            <a:schemeClr val="accent1">
-              <a:shade val="50000"/>
-            </a:schemeClr>
-          </a:lnRef>
-          <a:fillRef idx="1">
-            <a:schemeClr val="accent1"/>
-          </a:fillRef>
-          <a:effectRef idx="0">
-            <a:schemeClr val="accent1"/>
-          </a:effectRef>
-          <a:fontRef idx="minor">
-            <a:schemeClr val="lt1"/>
-          </a:fontRef>
-        </p:style>
-        <p:txBody>
-          <a:bodyPr rtlCol="0" anchor="ctr"/>
-          <a:lstStyle/>
-          <a:p>
-            <a:pPr algn="ctr"/>
-            <a:r>
-              <a:rPr lang="en-GB" sz="1000" dirty="0" smtClean="0">
-                <a:solidFill>
-                  <a:srgbClr val="002060"/>
-                </a:solidFill>
-              </a:rPr>
-              <a:t>health information</a:t>
-            </a:r>
-            <a:endParaRPr lang="en-GB" sz="1000" dirty="0">
-              <a:solidFill>
-                <a:srgbClr val="002060"/>
-              </a:solidFill>
-            </a:endParaRPr>
-          </a:p>
-        </p:txBody>
-      </p:sp>
-      <p:sp>
-        <p:nvSpPr>
-          <p:cNvPr id="68" name="Rectangle 67"/>
-          <p:cNvSpPr/>
-          <p:nvPr/>
-        </p:nvSpPr>
-        <p:spPr>
-          <a:xfrm>
-            <a:off x="6475374" y="1781288"/>
-            <a:ext cx="435833" cy="232967"/>
-          </a:xfrm>
-          <a:prstGeom prst="rect">
-            <a:avLst/>
-          </a:prstGeom>
-          <a:solidFill>
-            <a:schemeClr val="accent5">
-              <a:lumMod val="20000"/>
-              <a:lumOff val="80000"/>
-            </a:schemeClr>
-          </a:solidFill>
-          <a:ln w="3175">
-            <a:solidFill>
-              <a:schemeClr val="accent5">
-                <a:lumMod val="20000"/>
-                <a:lumOff val="80000"/>
-              </a:schemeClr>
-            </a:solidFill>
-          </a:ln>
-          <a:effectLst/>
-        </p:spPr>
-        <p:style>
-          <a:lnRef idx="2">
-            <a:schemeClr val="accent1">
-              <a:shade val="50000"/>
-            </a:schemeClr>
-          </a:lnRef>
-          <a:fillRef idx="1">
-            <a:schemeClr val="accent1"/>
-          </a:fillRef>
-          <a:effectRef idx="0">
-            <a:schemeClr val="accent1"/>
-          </a:effectRef>
-          <a:fontRef idx="minor">
-            <a:schemeClr val="lt1"/>
-          </a:fontRef>
-        </p:style>
-        <p:txBody>
-          <a:bodyPr lIns="36000" tIns="0" rIns="36000" bIns="0" rtlCol="0" anchor="ctr"/>
-          <a:lstStyle/>
-          <a:p>
-            <a:pPr algn="ctr"/>
-            <a:r>
-              <a:rPr lang="en-GB" sz="900" i="1" dirty="0" smtClean="0">
-                <a:solidFill>
-                  <a:schemeClr val="accent6">
-                    <a:lumMod val="75000"/>
-                  </a:schemeClr>
-                </a:solidFill>
-              </a:rPr>
-              <a:t>analyze</a:t>
-            </a:r>
-            <a:endParaRPr lang="en-GB" sz="1050" dirty="0">
-              <a:solidFill>
-                <a:srgbClr val="002060"/>
-              </a:solidFill>
-            </a:endParaRPr>
-          </a:p>
-        </p:txBody>
-      </p:sp>
-      <p:sp>
-        <p:nvSpPr>
-          <p:cNvPr id="69" name="Flowchart: Document 68"/>
-          <p:cNvSpPr/>
-          <p:nvPr/>
-        </p:nvSpPr>
-        <p:spPr>
-          <a:xfrm>
-            <a:off x="5233846" y="2141709"/>
-            <a:ext cx="605714" cy="279560"/>
-          </a:xfrm>
-          <a:prstGeom prst="flowChartDocument">
-            <a:avLst/>
-          </a:prstGeom>
-          <a:solidFill>
-            <a:schemeClr val="accent6">
-              <a:lumMod val="60000"/>
-              <a:lumOff val="40000"/>
-            </a:schemeClr>
-          </a:solidFill>
-          <a:ln w="6350">
-            <a:solidFill>
-              <a:schemeClr val="bg1">
-                <a:lumMod val="65000"/>
-              </a:schemeClr>
-            </a:solidFill>
-          </a:ln>
-          <a:effectLst/>
-        </p:spPr>
-        <p:style>
-          <a:lnRef idx="2">
-            <a:schemeClr val="accent1">
-              <a:shade val="50000"/>
-            </a:schemeClr>
-          </a:lnRef>
-          <a:fillRef idx="1">
-            <a:schemeClr val="accent1"/>
-          </a:fillRef>
-          <a:effectRef idx="0">
-            <a:schemeClr val="accent1"/>
-          </a:effectRef>
-          <a:fontRef idx="minor">
-            <a:schemeClr val="lt1"/>
-          </a:fontRef>
-        </p:style>
-        <p:txBody>
-          <a:bodyPr lIns="36000" tIns="0" rIns="36000" bIns="0" rtlCol="0" anchor="ctr"/>
-          <a:lstStyle/>
-          <a:p>
-            <a:pPr algn="ctr"/>
-            <a:r>
-              <a:rPr lang="en-GB" sz="1000" dirty="0" smtClean="0">
-                <a:solidFill>
-                  <a:srgbClr val="002060"/>
-                </a:solidFill>
-                <a:latin typeface="Arial Narrow" pitchFamily="34" charset="0"/>
-              </a:rPr>
-              <a:t>archetypes</a:t>
-            </a:r>
-            <a:endParaRPr lang="en-GB" sz="1000" dirty="0">
-              <a:solidFill>
-                <a:srgbClr val="002060"/>
-              </a:solidFill>
-              <a:latin typeface="Arial Narrow" pitchFamily="34" charset="0"/>
-            </a:endParaRPr>
-          </a:p>
-        </p:txBody>
-      </p:sp>
-      <p:sp>
-        <p:nvSpPr>
-          <p:cNvPr id="70" name="Down Arrow 69"/>
-          <p:cNvSpPr/>
-          <p:nvPr/>
-        </p:nvSpPr>
-        <p:spPr>
-          <a:xfrm rot="16200000">
-            <a:off x="5876991" y="2193884"/>
-            <a:ext cx="93186" cy="128616"/>
-          </a:xfrm>
-          <a:prstGeom prst="downArrow">
-            <a:avLst/>
-          </a:prstGeom>
-          <a:solidFill>
-            <a:schemeClr val="accent6">
-              <a:lumMod val="40000"/>
-              <a:lumOff val="60000"/>
-            </a:schemeClr>
-          </a:solidFill>
-          <a:ln w="6350">
-            <a:solidFill>
-              <a:schemeClr val="bg1">
-                <a:lumMod val="50000"/>
-              </a:schemeClr>
-            </a:solidFill>
-          </a:ln>
-        </p:spPr>
-        <p:style>
-          <a:lnRef idx="2">
-            <a:schemeClr val="accent1">
-              <a:shade val="50000"/>
-            </a:schemeClr>
-          </a:lnRef>
-          <a:fillRef idx="1">
-            <a:schemeClr val="accent1"/>
-          </a:fillRef>
-          <a:effectRef idx="0">
-            <a:schemeClr val="accent1"/>
-          </a:effectRef>
-          <a:fontRef idx="minor">
-            <a:schemeClr val="lt1"/>
-          </a:fontRef>
-        </p:style>
-        <p:txBody>
-          <a:bodyPr rtlCol="0" anchor="ctr"/>
-          <a:lstStyle/>
-          <a:p>
-            <a:pPr algn="ctr"/>
-            <a:endParaRPr lang="en-GB" sz="1050"/>
-          </a:p>
-        </p:txBody>
-      </p:sp>
-      <p:sp>
-        <p:nvSpPr>
-          <p:cNvPr id="71" name="Can 70"/>
-          <p:cNvSpPr/>
-          <p:nvPr/>
-        </p:nvSpPr>
-        <p:spPr>
-          <a:xfrm>
-            <a:off x="5217353" y="2480189"/>
-            <a:ext cx="648072" cy="279560"/>
-          </a:xfrm>
-          <a:prstGeom prst="can">
-            <a:avLst/>
-          </a:prstGeom>
-          <a:solidFill>
-            <a:schemeClr val="bg1">
-              <a:lumMod val="85000"/>
-            </a:schemeClr>
-          </a:solidFill>
-          <a:ln w="3175">
-            <a:solidFill>
-              <a:schemeClr val="bg1">
-                <a:lumMod val="65000"/>
-              </a:schemeClr>
-            </a:solidFill>
-          </a:ln>
-          <a:effectLst/>
-        </p:spPr>
-        <p:style>
-          <a:lnRef idx="2">
-            <a:schemeClr val="accent1">
-              <a:shade val="50000"/>
-            </a:schemeClr>
-          </a:lnRef>
-          <a:fillRef idx="1">
-            <a:schemeClr val="accent1"/>
-          </a:fillRef>
-          <a:effectRef idx="0">
-            <a:schemeClr val="accent1"/>
-          </a:effectRef>
-          <a:fontRef idx="minor">
-            <a:schemeClr val="lt1"/>
-          </a:fontRef>
-        </p:style>
-        <p:txBody>
-          <a:bodyPr lIns="36000" tIns="0" rIns="36000" bIns="0" rtlCol="0" anchor="ctr"/>
-          <a:lstStyle/>
-          <a:p>
-            <a:pPr algn="ctr"/>
-            <a:r>
-              <a:rPr lang="en-GB" sz="1000" dirty="0" smtClean="0">
-                <a:solidFill>
-                  <a:schemeClr val="bg1">
-                    <a:lumMod val="50000"/>
-                  </a:schemeClr>
-                </a:solidFill>
-                <a:latin typeface="Arial Narrow" pitchFamily="34" charset="0"/>
-              </a:rPr>
-              <a:t>terminology</a:t>
-            </a:r>
-            <a:endParaRPr lang="en-GB" sz="1050" dirty="0">
-              <a:solidFill>
-                <a:schemeClr val="bg1">
-                  <a:lumMod val="50000"/>
-                </a:schemeClr>
-              </a:solidFill>
-              <a:latin typeface="Arial Narrow" pitchFamily="34" charset="0"/>
-            </a:endParaRPr>
-          </a:p>
-        </p:txBody>
-      </p:sp>
-      <p:sp>
-        <p:nvSpPr>
-          <p:cNvPr id="72" name="TextBox 71"/>
-          <p:cNvSpPr txBox="1"/>
-          <p:nvPr/>
-        </p:nvSpPr>
-        <p:spPr>
-          <a:xfrm>
-            <a:off x="6004108" y="1430751"/>
-            <a:ext cx="436338" cy="253916"/>
-          </a:xfrm>
-          <a:prstGeom prst="rect">
-            <a:avLst/>
-          </a:prstGeom>
-          <a:noFill/>
-        </p:spPr>
-        <p:txBody>
-          <a:bodyPr wrap="none" rtlCol="0">
-            <a:spAutoFit/>
-          </a:bodyPr>
-          <a:lstStyle/>
-          <a:p>
-            <a:r>
-              <a:rPr lang="en-GB" sz="1000" i="1" dirty="0" smtClean="0">
-                <a:solidFill>
-                  <a:srgbClr val="002060"/>
-                </a:solidFill>
-              </a:rPr>
-              <a:t>data</a:t>
-            </a:r>
-            <a:endParaRPr lang="en-GB" sz="1000" i="1" dirty="0">
-              <a:solidFill>
-                <a:srgbClr val="002060"/>
-              </a:solidFill>
-            </a:endParaRPr>
-          </a:p>
-        </p:txBody>
-      </p:sp>
-      <p:sp>
-        <p:nvSpPr>
-          <p:cNvPr id="73" name="Down Arrow 72"/>
-          <p:cNvSpPr/>
-          <p:nvPr/>
-        </p:nvSpPr>
-        <p:spPr>
-          <a:xfrm>
-            <a:off x="6196539" y="1620964"/>
-            <a:ext cx="93186" cy="128618"/>
-          </a:xfrm>
-          <a:prstGeom prst="downArrow">
-            <a:avLst/>
-          </a:prstGeom>
-          <a:solidFill>
-            <a:schemeClr val="accent5">
-              <a:lumMod val="20000"/>
-              <a:lumOff val="80000"/>
-            </a:schemeClr>
-          </a:solidFill>
-          <a:ln w="6350">
-            <a:solidFill>
-              <a:schemeClr val="bg1">
-                <a:lumMod val="50000"/>
-              </a:schemeClr>
-            </a:solidFill>
-          </a:ln>
-        </p:spPr>
-        <p:style>
-          <a:lnRef idx="2">
-            <a:schemeClr val="accent1">
-              <a:shade val="50000"/>
-            </a:schemeClr>
-          </a:lnRef>
-          <a:fillRef idx="1">
-            <a:schemeClr val="accent1"/>
-          </a:fillRef>
-          <a:effectRef idx="0">
-            <a:schemeClr val="accent1"/>
-          </a:effectRef>
-          <a:fontRef idx="minor">
-            <a:schemeClr val="lt1"/>
-          </a:fontRef>
-        </p:style>
-        <p:txBody>
-          <a:bodyPr rtlCol="0" anchor="ctr"/>
-          <a:lstStyle/>
-          <a:p>
-            <a:pPr algn="ctr"/>
-            <a:endParaRPr lang="en-GB" sz="1050"/>
-          </a:p>
-        </p:txBody>
-      </p:sp>
-      <p:sp>
-        <p:nvSpPr>
-          <p:cNvPr id="74" name="Down Arrow 73"/>
-          <p:cNvSpPr/>
-          <p:nvPr/>
-        </p:nvSpPr>
-        <p:spPr>
-          <a:xfrm flipV="1">
-            <a:off x="6635423" y="1620964"/>
-            <a:ext cx="93186" cy="128618"/>
-          </a:xfrm>
-          <a:prstGeom prst="downArrow">
-            <a:avLst/>
-          </a:prstGeom>
-          <a:solidFill>
-            <a:schemeClr val="accent5">
-              <a:lumMod val="20000"/>
-              <a:lumOff val="80000"/>
-            </a:schemeClr>
-          </a:solidFill>
-          <a:ln w="6350">
-            <a:solidFill>
-              <a:schemeClr val="bg1">
-                <a:lumMod val="50000"/>
-              </a:schemeClr>
-            </a:solidFill>
-          </a:ln>
-        </p:spPr>
-        <p:style>
-          <a:lnRef idx="2">
-            <a:schemeClr val="accent1">
-              <a:shade val="50000"/>
-            </a:schemeClr>
-          </a:lnRef>
-          <a:fillRef idx="1">
-            <a:schemeClr val="accent1"/>
-          </a:fillRef>
-          <a:effectRef idx="0">
-            <a:schemeClr val="accent1"/>
-          </a:effectRef>
-          <a:fontRef idx="minor">
-            <a:schemeClr val="lt1"/>
-          </a:fontRef>
-        </p:style>
-        <p:txBody>
-          <a:bodyPr rtlCol="0" anchor="ctr"/>
-          <a:lstStyle/>
-          <a:p>
-            <a:pPr algn="ctr"/>
-            <a:endParaRPr lang="en-GB" sz="1050"/>
-          </a:p>
-        </p:txBody>
-      </p:sp>
-      <p:sp>
-        <p:nvSpPr>
-          <p:cNvPr id="75" name="TextBox 74"/>
-          <p:cNvSpPr txBox="1"/>
-          <p:nvPr/>
-        </p:nvSpPr>
-        <p:spPr>
-          <a:xfrm>
-            <a:off x="6303699" y="1430751"/>
-            <a:ext cx="776175" cy="246221"/>
-          </a:xfrm>
-          <a:prstGeom prst="rect">
-            <a:avLst/>
-          </a:prstGeom>
-          <a:noFill/>
-        </p:spPr>
-        <p:txBody>
-          <a:bodyPr wrap="none" rtlCol="0">
-            <a:spAutoFit/>
-          </a:bodyPr>
-          <a:lstStyle/>
-          <a:p>
-            <a:r>
-              <a:rPr lang="en-GB" sz="1000" i="1" dirty="0" smtClean="0">
-                <a:solidFill>
-                  <a:srgbClr val="002060"/>
-                </a:solidFill>
-              </a:rPr>
-              <a:t>conclusions</a:t>
-            </a:r>
-            <a:endParaRPr lang="en-GB" sz="1000" i="1" dirty="0">
-              <a:solidFill>
-                <a:srgbClr val="002060"/>
-              </a:solidFill>
-            </a:endParaRPr>
-          </a:p>
-        </p:txBody>
-      </p:sp>
       <p:sp>
         <p:nvSpPr>
           <p:cNvPr id="60" name="Rectangle 59"/>
@@ -30866,17 +30861,7 @@
                 <a:latin typeface="Arial" pitchFamily="34" charset="0"/>
                 <a:cs typeface="Arial" pitchFamily="34" charset="0"/>
               </a:rPr>
-              <a:t>c</a:t>
-            </a:r>
-            <a:r>
-              <a:rPr lang="en-GB" sz="1000" dirty="0" smtClean="0">
-                <a:solidFill>
-                  <a:srgbClr val="033761"/>
-                </a:solidFill>
-                <a:latin typeface="Arial" pitchFamily="34" charset="0"/>
-                <a:cs typeface="Arial" pitchFamily="34" charset="0"/>
-              </a:rPr>
-              <a:t>linical models</a:t>
+              <a:t>clinical models</a:t>
             </a:r>
             <a:endParaRPr lang="en-GB" sz="1000" dirty="0">
               <a:solidFill>
@@ -31432,17 +31417,7 @@
                 <a:latin typeface="Arial" pitchFamily="34" charset="0"/>
                 <a:cs typeface="Arial" pitchFamily="34" charset="0"/>
               </a:rPr>
-              <a:t>c</a:t>
-            </a:r>
-            <a:r>
-              <a:rPr lang="en-GB" sz="1000" dirty="0" smtClean="0">
-                <a:solidFill>
-                  <a:srgbClr val="033761"/>
-                </a:solidFill>
-                <a:latin typeface="Arial" pitchFamily="34" charset="0"/>
-                <a:cs typeface="Arial" pitchFamily="34" charset="0"/>
-              </a:rPr>
-              <a:t>linical models</a:t>
+              <a:t>clinical models</a:t>
             </a:r>
             <a:endParaRPr lang="en-GB" sz="1000" dirty="0">
               <a:solidFill>

</xml_diff>